<commit_message>
minor edit to figure
</commit_message>
<xml_diff>
--- a/Pubs/CDC16/CameraReady/figs/OverReachFigure_NL.pptx
+++ b/Pubs/CDC16/CameraReady/figs/OverReachFigure_NL.pptx
@@ -106,7 +106,7 @@
   </p:defaultTextStyle>
   <p:extLst>
     <p:ext uri="{EFAFB233-063F-42B5-8137-9DF3F51BA10A}">
-      <p15:sldGuideLst xmlns:p15="http://schemas.microsoft.com/office/powerpoint/2012/main">
+      <p15:sldGuideLst xmlns:p15="http://schemas.microsoft.com/office/powerpoint/2012/main" xmlns="">
         <p15:guide id="1" orient="horz" pos="2160">
           <p15:clr>
             <a:srgbClr val="A4A3A4"/>
@@ -304,7 +304,7 @@
           <a:p>
             <a:fld id="{2D15D275-A332-439B-8539-769CB1C78085}" type="datetimeFigureOut">
               <a:rPr lang="en-US" smtClean="0"/>
-              <a:t>3/15/16</a:t>
+              <a:t>8/25/2016</a:t>
             </a:fld>
             <a:endParaRPr lang="en-US"/>
           </a:p>
@@ -474,7 +474,7 @@
           <a:p>
             <a:fld id="{2D15D275-A332-439B-8539-769CB1C78085}" type="datetimeFigureOut">
               <a:rPr lang="en-US" smtClean="0"/>
-              <a:t>3/15/16</a:t>
+              <a:t>8/25/2016</a:t>
             </a:fld>
             <a:endParaRPr lang="en-US"/>
           </a:p>
@@ -654,7 +654,7 @@
           <a:p>
             <a:fld id="{2D15D275-A332-439B-8539-769CB1C78085}" type="datetimeFigureOut">
               <a:rPr lang="en-US" smtClean="0"/>
-              <a:t>3/15/16</a:t>
+              <a:t>8/25/2016</a:t>
             </a:fld>
             <a:endParaRPr lang="en-US"/>
           </a:p>
@@ -824,7 +824,7 @@
           <a:p>
             <a:fld id="{2D15D275-A332-439B-8539-769CB1C78085}" type="datetimeFigureOut">
               <a:rPr lang="en-US" smtClean="0"/>
-              <a:t>3/15/16</a:t>
+              <a:t>8/25/2016</a:t>
             </a:fld>
             <a:endParaRPr lang="en-US"/>
           </a:p>
@@ -1070,7 +1070,7 @@
           <a:p>
             <a:fld id="{2D15D275-A332-439B-8539-769CB1C78085}" type="datetimeFigureOut">
               <a:rPr lang="en-US" smtClean="0"/>
-              <a:t>3/15/16</a:t>
+              <a:t>8/25/2016</a:t>
             </a:fld>
             <a:endParaRPr lang="en-US"/>
           </a:p>
@@ -1358,7 +1358,7 @@
           <a:p>
             <a:fld id="{2D15D275-A332-439B-8539-769CB1C78085}" type="datetimeFigureOut">
               <a:rPr lang="en-US" smtClean="0"/>
-              <a:t>3/15/16</a:t>
+              <a:t>8/25/2016</a:t>
             </a:fld>
             <a:endParaRPr lang="en-US"/>
           </a:p>
@@ -1780,7 +1780,7 @@
           <a:p>
             <a:fld id="{2D15D275-A332-439B-8539-769CB1C78085}" type="datetimeFigureOut">
               <a:rPr lang="en-US" smtClean="0"/>
-              <a:t>3/15/16</a:t>
+              <a:t>8/25/2016</a:t>
             </a:fld>
             <a:endParaRPr lang="en-US"/>
           </a:p>
@@ -1898,7 +1898,7 @@
           <a:p>
             <a:fld id="{2D15D275-A332-439B-8539-769CB1C78085}" type="datetimeFigureOut">
               <a:rPr lang="en-US" smtClean="0"/>
-              <a:t>3/15/16</a:t>
+              <a:t>8/25/2016</a:t>
             </a:fld>
             <a:endParaRPr lang="en-US"/>
           </a:p>
@@ -1993,7 +1993,7 @@
           <a:p>
             <a:fld id="{2D15D275-A332-439B-8539-769CB1C78085}" type="datetimeFigureOut">
               <a:rPr lang="en-US" smtClean="0"/>
-              <a:t>3/15/16</a:t>
+              <a:t>8/25/2016</a:t>
             </a:fld>
             <a:endParaRPr lang="en-US"/>
           </a:p>
@@ -2270,7 +2270,7 @@
           <a:p>
             <a:fld id="{2D15D275-A332-439B-8539-769CB1C78085}" type="datetimeFigureOut">
               <a:rPr lang="en-US" smtClean="0"/>
-              <a:t>3/15/16</a:t>
+              <a:t>8/25/2016</a:t>
             </a:fld>
             <a:endParaRPr lang="en-US"/>
           </a:p>
@@ -2523,7 +2523,7 @@
           <a:p>
             <a:fld id="{2D15D275-A332-439B-8539-769CB1C78085}" type="datetimeFigureOut">
               <a:rPr lang="en-US" smtClean="0"/>
-              <a:t>3/15/16</a:t>
+              <a:t>8/25/2016</a:t>
             </a:fld>
             <a:endParaRPr lang="en-US"/>
           </a:p>
@@ -2736,7 +2736,7 @@
           <a:p>
             <a:fld id="{2D15D275-A332-439B-8539-769CB1C78085}" type="datetimeFigureOut">
               <a:rPr lang="en-US" smtClean="0"/>
-              <a:t>3/15/16</a:t>
+              <a:t>8/25/2016</a:t>
             </a:fld>
             <a:endParaRPr lang="en-US"/>
           </a:p>
@@ -3214,8 +3214,8 @@
             </a:p>
           </p:txBody>
         </p:sp>
-        <mc:AlternateContent xmlns:mc="http://schemas.openxmlformats.org/markup-compatibility/2006">
-          <mc:Choice xmlns:a14="http://schemas.microsoft.com/office/drawing/2010/main" Requires="a14">
+        <mc:AlternateContent xmlns:mc="http://schemas.openxmlformats.org/markup-compatibility/2006" xmlns:a14="http://schemas.microsoft.com/office/drawing/2010/main">
+          <mc:Choice Requires="a14">
             <p:sp>
               <p:nvSpPr>
                 <p:cNvPr id="8" name="TextBox 7"/>
@@ -3250,7 +3250,7 @@
                             <m:chr m:val="̂"/>
                             <m:ctrlPr>
                               <a:rPr lang="en-US" sz="1200" i="1" smtClean="0">
-                                <a:latin typeface="Cambria Math" charset="0"/>
+                                <a:latin typeface="Cambria Math"/>
                               </a:rPr>
                             </m:ctrlPr>
                           </m:accPr>
@@ -3277,7 +3277,7 @@
               </p:txBody>
             </p:sp>
           </mc:Choice>
-          <mc:Fallback>
+          <mc:Fallback xmlns="">
             <p:sp>
               <p:nvSpPr>
                 <p:cNvPr id="8" name="TextBox 7"/>
@@ -3317,8 +3317,8 @@
           </mc:Fallback>
         </mc:AlternateContent>
       </p:grpSp>
-      <mc:AlternateContent xmlns:mc="http://schemas.openxmlformats.org/markup-compatibility/2006">
-        <mc:Choice xmlns:a14="http://schemas.microsoft.com/office/drawing/2010/main" Requires="a14">
+      <mc:AlternateContent xmlns:mc="http://schemas.openxmlformats.org/markup-compatibility/2006" xmlns:a14="http://schemas.microsoft.com/office/drawing/2010/main">
+        <mc:Choice Requires="a14">
           <p:sp>
             <p:nvSpPr>
               <p:cNvPr id="12" name="TextBox 11"/>
@@ -3355,7 +3355,7 @@
                         <m:sSubPr>
                           <m:ctrlPr>
                             <a:rPr lang="en-US" sz="1400" i="1" smtClean="0">
-                              <a:latin typeface="Cambria Math" charset="0"/>
+                              <a:latin typeface="Cambria Math"/>
                             </a:rPr>
                           </m:ctrlPr>
                         </m:sSubPr>
@@ -3399,7 +3399,7 @@
                           <m:chr m:val="̂"/>
                           <m:ctrlPr>
                             <a:rPr lang="en-US" sz="1400" b="0" i="1" smtClean="0">
-                              <a:latin typeface="Cambria Math" charset="0"/>
+                              <a:latin typeface="Cambria Math"/>
                             </a:rPr>
                           </m:ctrlPr>
                         </m:accPr>
@@ -3408,7 +3408,7 @@
                             <m:sSubPr>
                               <m:ctrlPr>
                                 <a:rPr lang="en-US" sz="1400" b="0" i="1" smtClean="0">
-                                  <a:latin typeface="Cambria Math" charset="0"/>
+                                  <a:latin typeface="Cambria Math"/>
                                 </a:rPr>
                               </m:ctrlPr>
                             </m:sSubPr>
@@ -3466,7 +3466,7 @@
             </p:txBody>
           </p:sp>
         </mc:Choice>
-        <mc:Fallback>
+        <mc:Fallback xmlns="">
           <p:sp>
             <p:nvSpPr>
               <p:cNvPr id="12" name="TextBox 11"/>
@@ -3941,7 +3941,7 @@
         </p:nvSpPr>
         <p:spPr>
           <a:xfrm>
-            <a:off x="7903653" y="1912112"/>
+            <a:off x="7620000" y="1917412"/>
             <a:ext cx="685800" cy="584775"/>
           </a:xfrm>
           <a:prstGeom prst="rect">
@@ -3963,8 +3963,8 @@
           </a:p>
         </p:txBody>
       </p:sp>
-      <mc:AlternateContent xmlns:mc="http://schemas.openxmlformats.org/markup-compatibility/2006">
-        <mc:Choice xmlns:a14="http://schemas.microsoft.com/office/drawing/2010/main" Requires="a14">
+      <mc:AlternateContent xmlns:mc="http://schemas.openxmlformats.org/markup-compatibility/2006" xmlns:a14="http://schemas.microsoft.com/office/drawing/2010/main">
+        <mc:Choice Requires="a14">
           <p:sp>
             <p:nvSpPr>
               <p:cNvPr id="32" name="TextBox 31"/>
@@ -4000,7 +4000,7 @@
                         <m:sSubPr>
                           <m:ctrlPr>
                             <a:rPr lang="en-US" sz="1400" i="1" smtClean="0">
-                              <a:latin typeface="Cambria Math" charset="0"/>
+                              <a:latin typeface="Cambria Math"/>
                             </a:rPr>
                           </m:ctrlPr>
                         </m:sSubPr>
@@ -4010,7 +4010,7 @@
                               <m:chr m:val="̂"/>
                               <m:ctrlPr>
                                 <a:rPr lang="en-US" sz="1400" i="1" smtClean="0">
-                                  <a:latin typeface="Cambria Math" charset="0"/>
+                                  <a:latin typeface="Cambria Math"/>
                                 </a:rPr>
                               </m:ctrlPr>
                             </m:accPr>
@@ -4047,7 +4047,7 @@
             </p:txBody>
           </p:sp>
         </mc:Choice>
-        <mc:Fallback>
+        <mc:Fallback xmlns="">
           <p:sp>
             <p:nvSpPr>
               <p:cNvPr id="32" name="TextBox 31"/>
@@ -4242,8 +4242,8 @@
           </a:p>
         </p:txBody>
       </p:sp>
-      <mc:AlternateContent xmlns:mc="http://schemas.openxmlformats.org/markup-compatibility/2006">
-        <mc:Choice xmlns:a14="http://schemas.microsoft.com/office/drawing/2010/main" Requires="a14">
+      <mc:AlternateContent xmlns:mc="http://schemas.openxmlformats.org/markup-compatibility/2006" xmlns:a14="http://schemas.microsoft.com/office/drawing/2010/main">
+        <mc:Choice Requires="a14">
           <p:sp>
             <p:nvSpPr>
               <p:cNvPr id="2" name="Rectangle 1"/>
@@ -4265,6 +4265,7 @@
               </a:bodyPr>
               <a:lstStyle/>
               <a:p>
+                <a:pPr/>
                 <a14:m>
                   <m:oMathPara xmlns:m="http://schemas.openxmlformats.org/officeDocument/2006/math">
                     <m:oMathParaPr>
@@ -4275,7 +4276,7 @@
                         <m:sSubPr>
                           <m:ctrlPr>
                             <a:rPr lang="en-US" sz="1400" i="1">
-                              <a:latin typeface="Cambria Math" charset="0"/>
+                              <a:latin typeface="Cambria Math"/>
                             </a:rPr>
                           </m:ctrlPr>
                         </m:sSubPr>
@@ -4312,7 +4313,7 @@
                         <m:sSubPr>
                           <m:ctrlPr>
                             <a:rPr lang="en-US" sz="1400" i="1">
-                              <a:latin typeface="Cambria Math" charset="0"/>
+                              <a:latin typeface="Cambria Math"/>
                             </a:rPr>
                           </m:ctrlPr>
                         </m:sSubPr>
@@ -4380,7 +4381,7 @@
             </p:txBody>
           </p:sp>
         </mc:Choice>
-        <mc:Fallback>
+        <mc:Fallback xmlns="">
           <p:sp>
             <p:nvSpPr>
               <p:cNvPr id="2" name="Rectangle 1"/>
@@ -4419,8 +4420,8 @@
           </p:sp>
         </mc:Fallback>
       </mc:AlternateContent>
-      <mc:AlternateContent xmlns:mc="http://schemas.openxmlformats.org/markup-compatibility/2006">
-        <mc:Choice xmlns:a14="http://schemas.microsoft.com/office/drawing/2010/main" Requires="a14">
+      <mc:AlternateContent xmlns:mc="http://schemas.openxmlformats.org/markup-compatibility/2006" xmlns:a14="http://schemas.microsoft.com/office/drawing/2010/main">
+        <mc:Choice Requires="a14">
           <p:sp>
             <p:nvSpPr>
               <p:cNvPr id="108" name="Rectangle 107"/>
@@ -4442,6 +4443,7 @@
               </a:bodyPr>
               <a:lstStyle/>
               <a:p>
+                <a:pPr/>
                 <a14:m>
                   <m:oMathPara xmlns:m="http://schemas.openxmlformats.org/officeDocument/2006/math">
                     <m:oMathParaPr>
@@ -4452,7 +4454,7 @@
                         <m:sSubPr>
                           <m:ctrlPr>
                             <a:rPr lang="en-US" sz="1400" i="1" smtClean="0">
-                              <a:latin typeface="Cambria Math" charset="0"/>
+                              <a:latin typeface="Cambria Math"/>
                             </a:rPr>
                           </m:ctrlPr>
                         </m:sSubPr>
@@ -4489,7 +4491,7 @@
                         <m:sSubPr>
                           <m:ctrlPr>
                             <a:rPr lang="en-US" sz="1400" i="1">
-                              <a:latin typeface="Cambria Math" charset="0"/>
+                              <a:latin typeface="Cambria Math"/>
                             </a:rPr>
                           </m:ctrlPr>
                         </m:sSubPr>
@@ -4563,7 +4565,7 @@
             </p:txBody>
           </p:sp>
         </mc:Choice>
-        <mc:Fallback>
+        <mc:Fallback xmlns="">
           <p:sp>
             <p:nvSpPr>
               <p:cNvPr id="108" name="Rectangle 107"/>
@@ -4602,8 +4604,8 @@
           </p:sp>
         </mc:Fallback>
       </mc:AlternateContent>
-      <mc:AlternateContent xmlns:mc="http://schemas.openxmlformats.org/markup-compatibility/2006">
-        <mc:Choice xmlns:a14="http://schemas.microsoft.com/office/drawing/2010/main" Requires="a14">
+      <mc:AlternateContent xmlns:mc="http://schemas.openxmlformats.org/markup-compatibility/2006" xmlns:a14="http://schemas.microsoft.com/office/drawing/2010/main">
+        <mc:Choice Requires="a14">
           <p:sp>
             <p:nvSpPr>
               <p:cNvPr id="116" name="Rectangle 115"/>
@@ -4628,6 +4630,7 @@
               </a:bodyPr>
               <a:lstStyle/>
               <a:p>
+                <a:pPr/>
                 <a14:m>
                   <m:oMathPara xmlns:m="http://schemas.openxmlformats.org/officeDocument/2006/math">
                     <m:oMathParaPr>
@@ -4638,7 +4641,7 @@
                         <m:sSubPr>
                           <m:ctrlPr>
                             <a:rPr lang="en-US" sz="1400" i="1" smtClean="0">
-                              <a:latin typeface="Cambria Math" charset="0"/>
+                              <a:latin typeface="Cambria Math"/>
                             </a:rPr>
                           </m:ctrlPr>
                         </m:sSubPr>
@@ -4647,7 +4650,7 @@
                             <m:sSubPr>
                               <m:ctrlPr>
                                 <a:rPr lang="en-US" sz="1400" b="1" i="1">
-                                  <a:latin typeface="Cambria Math" charset="0"/>
+                                  <a:latin typeface="Cambria Math"/>
                                 </a:rPr>
                               </m:ctrlPr>
                             </m:sSubPr>
@@ -4724,7 +4727,7 @@
                         <m:dPr>
                           <m:ctrlPr>
                             <a:rPr lang="en-US" sz="1400" i="1">
-                              <a:latin typeface="Cambria Math" charset="0"/>
+                              <a:latin typeface="Cambria Math"/>
                             </a:rPr>
                           </m:ctrlPr>
                         </m:dPr>
@@ -4733,7 +4736,7 @@
                             <m:sSubPr>
                               <m:ctrlPr>
                                 <a:rPr lang="en-US" sz="1400" i="1">
-                                  <a:latin typeface="Cambria Math" charset="0"/>
+                                  <a:latin typeface="Cambria Math"/>
                                 </a:rPr>
                               </m:ctrlPr>
                             </m:sSubPr>
@@ -4793,7 +4796,7 @@
                         <m:dPr>
                           <m:ctrlPr>
                             <a:rPr lang="en-US" sz="1400" b="0" i="1" smtClean="0">
-                              <a:latin typeface="Cambria Math" charset="0"/>
+                              <a:latin typeface="Cambria Math"/>
                             </a:rPr>
                           </m:ctrlPr>
                         </m:dPr>
@@ -4832,7 +4835,7 @@
             </p:txBody>
           </p:sp>
         </mc:Choice>
-        <mc:Fallback>
+        <mc:Fallback xmlns="">
           <p:sp>
             <p:nvSpPr>
               <p:cNvPr id="116" name="Rectangle 115"/>
@@ -4874,8 +4877,8 @@
           </p:sp>
         </mc:Fallback>
       </mc:AlternateContent>
-      <mc:AlternateContent xmlns:mc="http://schemas.openxmlformats.org/markup-compatibility/2006">
-        <mc:Choice xmlns:a14="http://schemas.microsoft.com/office/drawing/2010/main" Requires="a14">
+      <mc:AlternateContent xmlns:mc="http://schemas.openxmlformats.org/markup-compatibility/2006" xmlns:a14="http://schemas.microsoft.com/office/drawing/2010/main">
+        <mc:Choice Requires="a14">
           <p:sp>
             <p:nvSpPr>
               <p:cNvPr id="120" name="Rectangle 119"/>
@@ -4897,6 +4900,7 @@
               </a:bodyPr>
               <a:lstStyle/>
               <a:p>
+                <a:pPr/>
                 <a14:m>
                   <m:oMathPara xmlns:m="http://schemas.openxmlformats.org/officeDocument/2006/math">
                     <m:oMathParaPr>
@@ -4907,7 +4911,7 @@
                         <m:sSubPr>
                           <m:ctrlPr>
                             <a:rPr lang="en-US" sz="1400" i="1" smtClean="0">
-                              <a:latin typeface="Cambria Math" charset="0"/>
+                              <a:latin typeface="Cambria Math"/>
                             </a:rPr>
                           </m:ctrlPr>
                         </m:sSubPr>
@@ -4930,13 +4934,7 @@
                             <a:rPr lang="en-US" sz="1400" b="0" i="1">
                               <a:latin typeface="Cambria Math" charset="0"/>
                             </a:rPr>
-                            <m:t>+1</m:t>
-                          </m:r>
-                          <m:r>
-                            <a:rPr lang="en-US" sz="1400" b="0" i="1">
-                              <a:latin typeface="Cambria Math" charset="0"/>
-                            </a:rPr>
-                            <m:t>|</m:t>
+                            <m:t>+1|</m:t>
                           </m:r>
                           <m:r>
                             <a:rPr lang="en-US" sz="1400" b="0" i="1">
@@ -4962,7 +4960,7 @@
                         <m:sSubPr>
                           <m:ctrlPr>
                             <a:rPr lang="en-US" sz="1400" b="0" i="1" smtClean="0">
-                              <a:latin typeface="Cambria Math" charset="0"/>
+                              <a:latin typeface="Cambria Math"/>
                             </a:rPr>
                           </m:ctrlPr>
                         </m:sSubPr>
@@ -4972,7 +4970,7 @@
                               <m:chr m:val="̂"/>
                               <m:ctrlPr>
                                 <a:rPr lang="en-US" sz="1400" b="0" i="1" smtClean="0">
-                                  <a:latin typeface="Cambria Math" charset="0"/>
+                                  <a:latin typeface="Cambria Math"/>
                                 </a:rPr>
                               </m:ctrlPr>
                             </m:accPr>
@@ -5039,7 +5037,7 @@
             </p:txBody>
           </p:sp>
         </mc:Choice>
-        <mc:Fallback>
+        <mc:Fallback xmlns="">
           <p:sp>
             <p:nvSpPr>
               <p:cNvPr id="120" name="Rectangle 119"/>
@@ -5288,8 +5286,8 @@
           </a:fontRef>
         </p:style>
       </p:cxnSp>
-      <mc:AlternateContent xmlns:mc="http://schemas.openxmlformats.org/markup-compatibility/2006">
-        <mc:Choice xmlns:a14="http://schemas.microsoft.com/office/drawing/2010/main" Requires="a14">
+      <mc:AlternateContent xmlns:mc="http://schemas.openxmlformats.org/markup-compatibility/2006" xmlns:a14="http://schemas.microsoft.com/office/drawing/2010/main">
+        <mc:Choice Requires="a14">
           <p:sp>
             <p:nvSpPr>
               <p:cNvPr id="147" name="Rectangle 146"/>
@@ -5311,6 +5309,7 @@
               </a:bodyPr>
               <a:lstStyle/>
               <a:p>
+                <a:pPr/>
                 <a14:m>
                   <m:oMathPara xmlns:m="http://schemas.openxmlformats.org/officeDocument/2006/math">
                     <m:oMathParaPr>
@@ -5321,7 +5320,7 @@
                         <m:sSubPr>
                           <m:ctrlPr>
                             <a:rPr lang="en-US" sz="1400" i="1" smtClean="0">
-                              <a:latin typeface="Cambria Math" charset="0"/>
+                              <a:latin typeface="Cambria Math"/>
                             </a:rPr>
                           </m:ctrlPr>
                         </m:sSubPr>
@@ -5358,7 +5357,7 @@
                         <m:sSubPr>
                           <m:ctrlPr>
                             <a:rPr lang="en-US" sz="1400" b="1" i="1">
-                              <a:latin typeface="Cambria Math" charset="0"/>
+                              <a:latin typeface="Cambria Math"/>
                             </a:rPr>
                           </m:ctrlPr>
                         </m:sSubPr>
@@ -5432,7 +5431,7 @@
             </p:txBody>
           </p:sp>
         </mc:Choice>
-        <mc:Fallback>
+        <mc:Fallback xmlns="">
           <p:sp>
             <p:nvSpPr>
               <p:cNvPr id="147" name="Rectangle 146"/>
@@ -5471,8 +5470,8 @@
           </p:sp>
         </mc:Fallback>
       </mc:AlternateContent>
-      <mc:AlternateContent xmlns:mc="http://schemas.openxmlformats.org/markup-compatibility/2006">
-        <mc:Choice xmlns:a14="http://schemas.microsoft.com/office/drawing/2010/main" Requires="a14">
+      <mc:AlternateContent xmlns:mc="http://schemas.openxmlformats.org/markup-compatibility/2006" xmlns:a14="http://schemas.microsoft.com/office/drawing/2010/main">
+        <mc:Choice Requires="a14">
           <p:sp>
             <p:nvSpPr>
               <p:cNvPr id="148" name="Rectangle 147"/>
@@ -5497,6 +5496,7 @@
               </a:bodyPr>
               <a:lstStyle/>
               <a:p>
+                <a:pPr/>
                 <a14:m>
                   <m:oMathPara xmlns:m="http://schemas.openxmlformats.org/officeDocument/2006/math">
                     <m:oMathParaPr>
@@ -5507,7 +5507,7 @@
                         <m:sSubPr>
                           <m:ctrlPr>
                             <a:rPr lang="en-US" sz="1400" i="1" smtClean="0">
-                              <a:latin typeface="Cambria Math" charset="0"/>
+                              <a:latin typeface="Cambria Math"/>
                             </a:rPr>
                           </m:ctrlPr>
                         </m:sSubPr>
@@ -5516,7 +5516,7 @@
                             <m:sSubPr>
                               <m:ctrlPr>
                                 <a:rPr lang="en-US" sz="1400" b="1" i="1">
-                                  <a:latin typeface="Cambria Math" charset="0"/>
+                                  <a:latin typeface="Cambria Math"/>
                                 </a:rPr>
                               </m:ctrlPr>
                             </m:sSubPr>
@@ -5599,7 +5599,7 @@
                         <m:sSubPr>
                           <m:ctrlPr>
                             <a:rPr lang="en-US" sz="1400" b="1" i="1">
-                              <a:latin typeface="Cambria Math" charset="0"/>
+                              <a:latin typeface="Cambria Math"/>
                             </a:rPr>
                           </m:ctrlPr>
                         </m:sSubPr>
@@ -5703,7 +5703,7 @@
             </p:txBody>
           </p:sp>
         </mc:Choice>
-        <mc:Fallback>
+        <mc:Fallback xmlns="">
           <p:sp>
             <p:nvSpPr>
               <p:cNvPr id="148" name="Rectangle 147"/>
@@ -5781,8 +5781,8 @@
           </a:fontRef>
         </p:style>
       </p:cxnSp>
-      <mc:AlternateContent xmlns:mc="http://schemas.openxmlformats.org/markup-compatibility/2006">
-        <mc:Choice xmlns:a14="http://schemas.microsoft.com/office/drawing/2010/main" Requires="a14">
+      <mc:AlternateContent xmlns:mc="http://schemas.openxmlformats.org/markup-compatibility/2006" xmlns:a14="http://schemas.microsoft.com/office/drawing/2010/main">
+        <mc:Choice Requires="a14">
           <p:sp>
             <p:nvSpPr>
               <p:cNvPr id="168" name="Rectangle 167"/>
@@ -5804,6 +5804,7 @@
               </a:bodyPr>
               <a:lstStyle/>
               <a:p>
+                <a:pPr/>
                 <a14:m>
                   <m:oMathPara xmlns:m="http://schemas.openxmlformats.org/officeDocument/2006/math">
                     <m:oMathParaPr>
@@ -5814,7 +5815,7 @@
                         <m:sSubPr>
                           <m:ctrlPr>
                             <a:rPr lang="en-US" sz="1400" i="1" smtClean="0">
-                              <a:latin typeface="Cambria Math" charset="0"/>
+                              <a:latin typeface="Cambria Math"/>
                             </a:rPr>
                           </m:ctrlPr>
                         </m:sSubPr>
@@ -5851,7 +5852,7 @@
                         <m:sSubPr>
                           <m:ctrlPr>
                             <a:rPr lang="en-US" sz="1400" i="1">
-                              <a:latin typeface="Cambria Math" charset="0"/>
+                              <a:latin typeface="Cambria Math"/>
                             </a:rPr>
                           </m:ctrlPr>
                         </m:sSubPr>
@@ -5925,7 +5926,7 @@
             </p:txBody>
           </p:sp>
         </mc:Choice>
-        <mc:Fallback>
+        <mc:Fallback xmlns="">
           <p:sp>
             <p:nvSpPr>
               <p:cNvPr id="168" name="Rectangle 167"/>
@@ -6003,8 +6004,8 @@
           </a:fontRef>
         </p:style>
       </p:cxnSp>
-      <mc:AlternateContent xmlns:mc="http://schemas.openxmlformats.org/markup-compatibility/2006">
-        <mc:Choice xmlns:a14="http://schemas.microsoft.com/office/drawing/2010/main" Requires="a14">
+      <mc:AlternateContent xmlns:mc="http://schemas.openxmlformats.org/markup-compatibility/2006" xmlns:a14="http://schemas.microsoft.com/office/drawing/2010/main">
+        <mc:Choice Requires="a14">
           <p:sp>
             <p:nvSpPr>
               <p:cNvPr id="174" name="Rectangle 173"/>
@@ -6026,6 +6027,7 @@
               </a:bodyPr>
               <a:lstStyle/>
               <a:p>
+                <a:pPr/>
                 <a14:m>
                   <m:oMathPara xmlns:m="http://schemas.openxmlformats.org/officeDocument/2006/math">
                     <m:oMathParaPr>
@@ -6036,7 +6038,7 @@
                         <m:sSubPr>
                           <m:ctrlPr>
                             <a:rPr lang="en-US" sz="1400" i="1" smtClean="0">
-                              <a:latin typeface="Cambria Math" charset="0"/>
+                              <a:latin typeface="Cambria Math"/>
                             </a:rPr>
                           </m:ctrlPr>
                         </m:sSubPr>
@@ -6045,7 +6047,7 @@
                             <m:sSubPr>
                               <m:ctrlPr>
                                 <a:rPr lang="en-US" sz="1400" b="1" i="1">
-                                  <a:latin typeface="Cambria Math" charset="0"/>
+                                  <a:latin typeface="Cambria Math"/>
                                 </a:rPr>
                               </m:ctrlPr>
                             </m:sSubPr>
@@ -6140,7 +6142,7 @@
                         <m:sSubPr>
                           <m:ctrlPr>
                             <a:rPr lang="en-US" sz="1400" i="1">
-                              <a:latin typeface="Cambria Math" charset="0"/>
+                              <a:latin typeface="Cambria Math"/>
                             </a:rPr>
                           </m:ctrlPr>
                         </m:sSubPr>
@@ -6163,13 +6165,7 @@
                             <a:rPr lang="en-US" sz="1400" b="0" i="1">
                               <a:latin typeface="Cambria Math" charset="0"/>
                             </a:rPr>
-                            <m:t>+1</m:t>
-                          </m:r>
-                          <m:r>
-                            <a:rPr lang="en-US" sz="1400" b="0" i="1">
-                              <a:latin typeface="Cambria Math" charset="0"/>
-                            </a:rPr>
-                            <m:t>|</m:t>
+                            <m:t>+1|</m:t>
                           </m:r>
                           <m:r>
                             <a:rPr lang="en-US" sz="1400" b="0" i="1">
@@ -6244,7 +6240,7 @@
             </p:txBody>
           </p:sp>
         </mc:Choice>
-        <mc:Fallback>
+        <mc:Fallback xmlns="">
           <p:sp>
             <p:nvSpPr>
               <p:cNvPr id="174" name="Rectangle 173"/>

</xml_diff>